<commit_message>
include conceptual diagram; fill out questions/purpose of episode 00
</commit_message>
<xml_diff>
--- a/files/himatDataDiagram.pptx
+++ b/files/himatDataDiagram.pptx
@@ -104,6 +104,11 @@
       </a:defRPr>
     </a:lvl9pPr>
   </p:defaultTextStyle>
+  <p:extLst>
+    <p:ext uri="{EFAFB233-063F-42B5-8137-9DF3F51BA10A}">
+      <p15:sldGuideLst xmlns:p15="http://schemas.microsoft.com/office/powerpoint/2012/main"/>
+    </p:ext>
+  </p:extLst>
 </p:presentation>
 </file>
 
@@ -152,7 +157,6 @@
               <a:rPr lang="en-US"/>
               <a:t>Click to edit Master title style</a:t>
             </a:r>
-            <a:endParaRPr lang="en-US"/>
           </a:p>
         </p:txBody>
       </p:sp>
@@ -217,7 +221,6 @@
               <a:rPr lang="en-US"/>
               <a:t>Click to edit Master subtitle style</a:t>
             </a:r>
-            <a:endParaRPr lang="en-US"/>
           </a:p>
         </p:txBody>
       </p:sp>
@@ -238,7 +241,7 @@
           <a:p>
             <a:fld id="{7DD1CECC-C3E8-4C92-BF03-1D4DEC9E1382}" type="datetimeFigureOut">
               <a:rPr lang="en-US" smtClean="0"/>
-              <a:t>3/6/2017</a:t>
+              <a:t>3/8/2017</a:t>
             </a:fld>
             <a:endParaRPr lang="en-US"/>
           </a:p>
@@ -335,7 +338,6 @@
               <a:rPr lang="en-US"/>
               <a:t>Click to edit Master title style</a:t>
             </a:r>
-            <a:endParaRPr lang="en-US"/>
           </a:p>
         </p:txBody>
       </p:sp>
@@ -387,7 +389,6 @@
               <a:rPr lang="en-US"/>
               <a:t>Fifth level</a:t>
             </a:r>
-            <a:endParaRPr lang="en-US"/>
           </a:p>
         </p:txBody>
       </p:sp>
@@ -408,7 +409,7 @@
           <a:p>
             <a:fld id="{7DD1CECC-C3E8-4C92-BF03-1D4DEC9E1382}" type="datetimeFigureOut">
               <a:rPr lang="en-US" smtClean="0"/>
-              <a:t>3/6/2017</a:t>
+              <a:t>3/8/2017</a:t>
             </a:fld>
             <a:endParaRPr lang="en-US"/>
           </a:p>
@@ -510,7 +511,6 @@
               <a:rPr lang="en-US"/>
               <a:t>Click to edit Master title style</a:t>
             </a:r>
-            <a:endParaRPr lang="en-US"/>
           </a:p>
         </p:txBody>
       </p:sp>
@@ -567,7 +567,6 @@
               <a:rPr lang="en-US"/>
               <a:t>Fifth level</a:t>
             </a:r>
-            <a:endParaRPr lang="en-US"/>
           </a:p>
         </p:txBody>
       </p:sp>
@@ -588,7 +587,7 @@
           <a:p>
             <a:fld id="{7DD1CECC-C3E8-4C92-BF03-1D4DEC9E1382}" type="datetimeFigureOut">
               <a:rPr lang="en-US" smtClean="0"/>
-              <a:t>3/6/2017</a:t>
+              <a:t>3/8/2017</a:t>
             </a:fld>
             <a:endParaRPr lang="en-US"/>
           </a:p>
@@ -685,7 +684,6 @@
               <a:rPr lang="en-US"/>
               <a:t>Click to edit Master title style</a:t>
             </a:r>
-            <a:endParaRPr lang="en-US"/>
           </a:p>
         </p:txBody>
       </p:sp>
@@ -737,7 +735,6 @@
               <a:rPr lang="en-US"/>
               <a:t>Fifth level</a:t>
             </a:r>
-            <a:endParaRPr lang="en-US"/>
           </a:p>
         </p:txBody>
       </p:sp>
@@ -758,7 +755,7 @@
           <a:p>
             <a:fld id="{7DD1CECC-C3E8-4C92-BF03-1D4DEC9E1382}" type="datetimeFigureOut">
               <a:rPr lang="en-US" smtClean="0"/>
-              <a:t>3/6/2017</a:t>
+              <a:t>3/8/2017</a:t>
             </a:fld>
             <a:endParaRPr lang="en-US"/>
           </a:p>
@@ -864,7 +861,6 @@
               <a:rPr lang="en-US"/>
               <a:t>Click to edit Master title style</a:t>
             </a:r>
-            <a:endParaRPr lang="en-US"/>
           </a:p>
         </p:txBody>
       </p:sp>
@@ -1004,7 +1000,7 @@
           <a:p>
             <a:fld id="{7DD1CECC-C3E8-4C92-BF03-1D4DEC9E1382}" type="datetimeFigureOut">
               <a:rPr lang="en-US" smtClean="0"/>
-              <a:t>3/6/2017</a:t>
+              <a:t>3/8/2017</a:t>
             </a:fld>
             <a:endParaRPr lang="en-US"/>
           </a:p>
@@ -1101,7 +1097,6 @@
               <a:rPr lang="en-US"/>
               <a:t>Click to edit Master title style</a:t>
             </a:r>
-            <a:endParaRPr lang="en-US"/>
           </a:p>
         </p:txBody>
       </p:sp>
@@ -1158,7 +1153,6 @@
               <a:rPr lang="en-US"/>
               <a:t>Fifth level</a:t>
             </a:r>
-            <a:endParaRPr lang="en-US"/>
           </a:p>
         </p:txBody>
       </p:sp>
@@ -1215,7 +1209,6 @@
               <a:rPr lang="en-US"/>
               <a:t>Fifth level</a:t>
             </a:r>
-            <a:endParaRPr lang="en-US"/>
           </a:p>
         </p:txBody>
       </p:sp>
@@ -1236,7 +1229,7 @@
           <a:p>
             <a:fld id="{7DD1CECC-C3E8-4C92-BF03-1D4DEC9E1382}" type="datetimeFigureOut">
               <a:rPr lang="en-US" smtClean="0"/>
-              <a:t>3/6/2017</a:t>
+              <a:t>3/8/2017</a:t>
             </a:fld>
             <a:endParaRPr lang="en-US"/>
           </a:p>
@@ -1338,7 +1331,6 @@
               <a:rPr lang="en-US"/>
               <a:t>Click to edit Master title style</a:t>
             </a:r>
-            <a:endParaRPr lang="en-US"/>
           </a:p>
         </p:txBody>
       </p:sp>
@@ -1460,7 +1452,6 @@
               <a:rPr lang="en-US"/>
               <a:t>Fifth level</a:t>
             </a:r>
-            <a:endParaRPr lang="en-US"/>
           </a:p>
         </p:txBody>
       </p:sp>
@@ -1582,7 +1573,6 @@
               <a:rPr lang="en-US"/>
               <a:t>Fifth level</a:t>
             </a:r>
-            <a:endParaRPr lang="en-US"/>
           </a:p>
         </p:txBody>
       </p:sp>
@@ -1603,7 +1593,7 @@
           <a:p>
             <a:fld id="{7DD1CECC-C3E8-4C92-BF03-1D4DEC9E1382}" type="datetimeFigureOut">
               <a:rPr lang="en-US" smtClean="0"/>
-              <a:t>3/6/2017</a:t>
+              <a:t>3/8/2017</a:t>
             </a:fld>
             <a:endParaRPr lang="en-US"/>
           </a:p>
@@ -1700,7 +1690,6 @@
               <a:rPr lang="en-US"/>
               <a:t>Click to edit Master title style</a:t>
             </a:r>
-            <a:endParaRPr lang="en-US"/>
           </a:p>
         </p:txBody>
       </p:sp>
@@ -1721,7 +1710,7 @@
           <a:p>
             <a:fld id="{7DD1CECC-C3E8-4C92-BF03-1D4DEC9E1382}" type="datetimeFigureOut">
               <a:rPr lang="en-US" smtClean="0"/>
-              <a:t>3/6/2017</a:t>
+              <a:t>3/8/2017</a:t>
             </a:fld>
             <a:endParaRPr lang="en-US"/>
           </a:p>
@@ -1816,7 +1805,7 @@
           <a:p>
             <a:fld id="{7DD1CECC-C3E8-4C92-BF03-1D4DEC9E1382}" type="datetimeFigureOut">
               <a:rPr lang="en-US" smtClean="0"/>
-              <a:t>3/6/2017</a:t>
+              <a:t>3/8/2017</a:t>
             </a:fld>
             <a:endParaRPr lang="en-US"/>
           </a:p>
@@ -1922,7 +1911,6 @@
               <a:rPr lang="en-US"/>
               <a:t>Click to edit Master title style</a:t>
             </a:r>
-            <a:endParaRPr lang="en-US"/>
           </a:p>
         </p:txBody>
       </p:sp>
@@ -2007,7 +1995,6 @@
               <a:rPr lang="en-US"/>
               <a:t>Fifth level</a:t>
             </a:r>
-            <a:endParaRPr lang="en-US"/>
           </a:p>
         </p:txBody>
       </p:sp>
@@ -2093,7 +2080,7 @@
           <a:p>
             <a:fld id="{7DD1CECC-C3E8-4C92-BF03-1D4DEC9E1382}" type="datetimeFigureOut">
               <a:rPr lang="en-US" smtClean="0"/>
-              <a:t>3/6/2017</a:t>
+              <a:t>3/8/2017</a:t>
             </a:fld>
             <a:endParaRPr lang="en-US"/>
           </a:p>
@@ -2199,7 +2186,6 @@
               <a:rPr lang="en-US"/>
               <a:t>Click to edit Master title style</a:t>
             </a:r>
-            <a:endParaRPr lang="en-US"/>
           </a:p>
         </p:txBody>
       </p:sp>
@@ -2346,7 +2332,7 @@
           <a:p>
             <a:fld id="{7DD1CECC-C3E8-4C92-BF03-1D4DEC9E1382}" type="datetimeFigureOut">
               <a:rPr lang="en-US" smtClean="0"/>
-              <a:t>3/6/2017</a:t>
+              <a:t>3/8/2017</a:t>
             </a:fld>
             <a:endParaRPr lang="en-US"/>
           </a:p>
@@ -2458,7 +2444,6 @@
               <a:rPr lang="en-US"/>
               <a:t>Click to edit Master title style</a:t>
             </a:r>
-            <a:endParaRPr lang="en-US"/>
           </a:p>
         </p:txBody>
       </p:sp>
@@ -2520,7 +2505,6 @@
               <a:rPr lang="en-US"/>
               <a:t>Fifth level</a:t>
             </a:r>
-            <a:endParaRPr lang="en-US"/>
           </a:p>
         </p:txBody>
       </p:sp>
@@ -2559,7 +2543,7 @@
           <a:p>
             <a:fld id="{7DD1CECC-C3E8-4C92-BF03-1D4DEC9E1382}" type="datetimeFigureOut">
               <a:rPr lang="en-US" smtClean="0"/>
-              <a:t>3/6/2017</a:t>
+              <a:t>3/8/2017</a:t>
             </a:fld>
             <a:endParaRPr lang="en-US"/>
           </a:p>
@@ -3071,7 +3055,7 @@
         </p:blipFill>
         <p:spPr>
           <a:xfrm>
-            <a:off x="10074663" y="2232076"/>
+            <a:off x="10098950" y="2255587"/>
             <a:ext cx="648145" cy="586612"/>
           </a:xfrm>
           <a:prstGeom prst="rect">
@@ -3252,7 +3236,7 @@
                   <a:uLnTx/>
                   <a:uFillTx/>
                 </a:rPr>
-                <a:t>-&gt; temporary data service in the commercial cloud (Amazon Web Service)</a:t>
+                <a:t>-&gt; temporary data service in the cloud</a:t>
               </a:r>
             </a:p>
             <a:p>
@@ -3279,17 +3263,37 @@
                 </a:rPr>
                 <a:t>-&gt; password protection on himat.org</a:t>
               </a:r>
-              <a:endParaRPr kumimoji="0" lang="en-US" sz="1100" i="0" u="none" strike="noStrike" kern="0" cap="none" spc="0" normalizeH="0" baseline="0" noProof="0" dirty="0">
-                <a:ln>
-                  <a:noFill/>
-                </a:ln>
-                <a:solidFill>
-                  <a:sysClr val="windowText" lastClr="000000"/>
-                </a:solidFill>
-                <a:effectLst/>
-                <a:uLnTx/>
-                <a:uFillTx/>
-              </a:endParaRPr>
+            </a:p>
+            <a:p>
+              <a:pPr marR="0" lvl="0" algn="ctr" defTabSz="914400" eaLnBrk="1" fontAlgn="auto" latinLnBrk="0" hangingPunct="1">
+                <a:lnSpc>
+                  <a:spcPct val="100000"/>
+                </a:lnSpc>
+                <a:spcBef>
+                  <a:spcPts val="0"/>
+                </a:spcBef>
+                <a:spcAft>
+                  <a:spcPts val="0"/>
+                </a:spcAft>
+                <a:buClrTx/>
+                <a:buSzTx/>
+                <a:tabLst/>
+                <a:defRPr/>
+              </a:pPr>
+              <a:r>
+                <a:rPr kumimoji="0" lang="en-US" sz="1100" i="0" u="none" strike="noStrike" kern="0" cap="none" spc="0" normalizeH="0" baseline="0" noProof="0" dirty="0">
+                  <a:ln>
+                    <a:noFill/>
+                  </a:ln>
+                  <a:solidFill>
+                    <a:sysClr val="windowText" lastClr="000000"/>
+                  </a:solidFill>
+                  <a:effectLst/>
+                  <a:uLnTx/>
+                  <a:uFillTx/>
+                </a:rPr>
+                <a:t>-&gt; can serve both raster and vector data</a:t>
+              </a:r>
             </a:p>
           </p:txBody>
         </p:sp>
@@ -3297,15 +3301,13 @@
       <p:cxnSp>
         <p:nvCxnSpPr>
           <p:cNvPr id="251" name="Straight Arrow Connector 250"/>
-          <p:cNvCxnSpPr>
-            <a:stCxn id="241" idx="1"/>
-          </p:cNvCxnSpPr>
+          <p:cNvCxnSpPr/>
           <p:nvPr/>
         </p:nvCxnSpPr>
         <p:spPr>
           <a:xfrm flipH="1" flipV="1">
-            <a:off x="2423284" y="1864025"/>
-            <a:ext cx="571240" cy="2013374"/>
+            <a:off x="2446924" y="1948920"/>
+            <a:ext cx="771841" cy="869463"/>
           </a:xfrm>
           <a:prstGeom prst="straightConnector1">
             <a:avLst/>
@@ -3374,7 +3376,7 @@
         </p:blipFill>
         <p:spPr>
           <a:xfrm>
-            <a:off x="2127614" y="351536"/>
+            <a:off x="2183369" y="351536"/>
             <a:ext cx="477973" cy="432596"/>
           </a:xfrm>
           <a:prstGeom prst="rect">
@@ -3876,7 +3878,7 @@
         </p:nvSpPr>
         <p:spPr>
           <a:xfrm>
-            <a:off x="6665312" y="1285641"/>
+            <a:off x="6509198" y="1285641"/>
             <a:ext cx="1935623" cy="461665"/>
           </a:xfrm>
           <a:prstGeom prst="rect">
@@ -3890,7 +3892,7 @@
           </a:bodyPr>
           <a:lstStyle/>
           <a:p>
-            <a:pPr marL="0" marR="0" lvl="0" indent="0" defTabSz="914400" eaLnBrk="1" fontAlgn="auto" latinLnBrk="0" hangingPunct="1">
+            <a:pPr marL="0" marR="0" lvl="0" indent="0" algn="ctr" defTabSz="914400" eaLnBrk="1" fontAlgn="auto" latinLnBrk="0" hangingPunct="1">
               <a:lnSpc>
                 <a:spcPct val="100000"/>
               </a:lnSpc>
@@ -3957,7 +3959,7 @@
         </p:nvSpPr>
         <p:spPr>
           <a:xfrm>
-            <a:off x="8608740" y="1265568"/>
+            <a:off x="8452626" y="1265568"/>
             <a:ext cx="1637628" cy="461665"/>
           </a:xfrm>
           <a:prstGeom prst="rect">
@@ -3971,7 +3973,7 @@
           </a:bodyPr>
           <a:lstStyle/>
           <a:p>
-            <a:pPr marL="0" marR="0" lvl="0" indent="0" defTabSz="914400" eaLnBrk="1" fontAlgn="auto" latinLnBrk="0" hangingPunct="1">
+            <a:pPr marL="0" marR="0" lvl="0" indent="0" algn="ctr" defTabSz="914400" eaLnBrk="1" fontAlgn="auto" latinLnBrk="0" hangingPunct="1">
               <a:lnSpc>
                 <a:spcPct val="100000"/>
               </a:lnSpc>
@@ -4468,7 +4470,7 @@
           <p:spPr>
             <a:xfrm>
               <a:off x="5767563" y="877439"/>
-              <a:ext cx="738445" cy="113775"/>
+              <a:ext cx="738445" cy="261013"/>
             </a:xfrm>
             <a:prstGeom prst="rect">
               <a:avLst/>
@@ -4513,6 +4515,91 @@
                 <a:t>NSIDC DAAC</a:t>
               </a:r>
             </a:p>
+            <a:p>
+              <a:pPr marL="0" marR="0" lvl="0" indent="0" algn="ctr" defTabSz="914400" eaLnBrk="1" fontAlgn="auto" latinLnBrk="0" hangingPunct="1">
+                <a:lnSpc>
+                  <a:spcPct val="100000"/>
+                </a:lnSpc>
+                <a:spcBef>
+                  <a:spcPts val="0"/>
+                </a:spcBef>
+                <a:spcAft>
+                  <a:spcPts val="0"/>
+                </a:spcAft>
+                <a:buClrTx/>
+                <a:buSzTx/>
+                <a:buFontTx/>
+                <a:buNone/>
+                <a:tabLst/>
+                <a:defRPr/>
+              </a:pPr>
+              <a:r>
+                <a:rPr lang="en-US" sz="1100" kern="0" dirty="0">
+                  <a:solidFill>
+                    <a:sysClr val="windowText" lastClr="000000"/>
+                  </a:solidFill>
+                </a:rPr>
+                <a:t>-&gt; long-term archive </a:t>
+              </a:r>
+            </a:p>
+            <a:p>
+              <a:pPr marL="0" marR="0" lvl="0" indent="0" algn="ctr" defTabSz="914400" eaLnBrk="1" fontAlgn="auto" latinLnBrk="0" hangingPunct="1">
+                <a:lnSpc>
+                  <a:spcPct val="100000"/>
+                </a:lnSpc>
+                <a:spcBef>
+                  <a:spcPts val="0"/>
+                </a:spcBef>
+                <a:spcAft>
+                  <a:spcPts val="0"/>
+                </a:spcAft>
+                <a:buClrTx/>
+                <a:buSzTx/>
+                <a:buFontTx/>
+                <a:buNone/>
+                <a:tabLst/>
+                <a:defRPr/>
+              </a:pPr>
+              <a:r>
+                <a:rPr kumimoji="0" lang="en-US" sz="1100" i="0" u="none" strike="noStrike" kern="0" cap="none" spc="0" normalizeH="0" baseline="0" noProof="0" dirty="0">
+                  <a:ln>
+                    <a:noFill/>
+                  </a:ln>
+                  <a:solidFill>
+                    <a:sysClr val="windowText" lastClr="000000"/>
+                  </a:solidFill>
+                  <a:effectLst/>
+                  <a:uLnTx/>
+                  <a:uFillTx/>
+                </a:rPr>
+                <a:t>-&gt;</a:t>
+              </a:r>
+              <a:r>
+                <a:rPr kumimoji="0" lang="en-US" sz="1100" i="0" u="none" strike="noStrike" kern="0" cap="none" spc="0" normalizeH="0" noProof="0" dirty="0">
+                  <a:ln>
+                    <a:noFill/>
+                  </a:ln>
+                  <a:solidFill>
+                    <a:sysClr val="windowText" lastClr="000000"/>
+                  </a:solidFill>
+                  <a:effectLst/>
+                  <a:uLnTx/>
+                  <a:uFillTx/>
+                </a:rPr>
+                <a:t> detailed metadata</a:t>
+              </a:r>
+              <a:endParaRPr kumimoji="0" lang="en-US" sz="1100" i="0" u="none" strike="noStrike" kern="0" cap="none" spc="0" normalizeH="0" baseline="0" noProof="0" dirty="0">
+                <a:ln>
+                  <a:noFill/>
+                </a:ln>
+                <a:solidFill>
+                  <a:sysClr val="windowText" lastClr="000000"/>
+                </a:solidFill>
+                <a:effectLst/>
+                <a:uLnTx/>
+                <a:uFillTx/>
+              </a:endParaRPr>
+            </a:p>
           </p:txBody>
         </p:sp>
       </p:grpSp>
@@ -4708,7 +4795,7 @@
                   <a:sysClr val="windowText" lastClr="000000"/>
                 </a:solidFill>
               </a:rPr>
-              <a:t>run scripts to operate on data within ADAPT</a:t>
+              <a:t>run scripts to operate on data directly within ADAPT</a:t>
             </a:r>
             <a:endParaRPr kumimoji="0" lang="en-US" sz="1200" i="0" u="none" strike="noStrike" kern="0" cap="none" spc="0" normalizeH="0" baseline="0" noProof="0" dirty="0">
               <a:ln>
@@ -4763,7 +4850,7 @@
         </p:nvSpPr>
         <p:spPr>
           <a:xfrm>
-            <a:off x="194357" y="2435120"/>
+            <a:off x="339320" y="2435120"/>
             <a:ext cx="1738811" cy="1015663"/>
           </a:xfrm>
           <a:prstGeom prst="rect">
@@ -4890,7 +4977,7 @@
         </p:blipFill>
         <p:spPr>
           <a:xfrm>
-            <a:off x="1455195" y="2006932"/>
+            <a:off x="1622460" y="2006932"/>
             <a:ext cx="477973" cy="432596"/>
           </a:xfrm>
           <a:prstGeom prst="rect">
@@ -4907,9 +4994,9 @@
           <p:nvPr/>
         </p:nvCxnSpPr>
         <p:spPr>
-          <a:xfrm flipH="1" flipV="1">
-            <a:off x="1933168" y="2942952"/>
-            <a:ext cx="1106971" cy="1021617"/>
+          <a:xfrm flipH="1">
+            <a:off x="2078131" y="2818383"/>
+            <a:ext cx="1157978" cy="124569"/>
           </a:xfrm>
           <a:prstGeom prst="straightConnector1">
             <a:avLst/>
@@ -5116,7 +5203,7 @@
                   <a:sysClr val="windowText" lastClr="000000"/>
                 </a:solidFill>
               </a:rPr>
-              <a:t>access data directly within local GIS software, </a:t>
+              <a:t>access data directly from remote GIS software, </a:t>
             </a:r>
             <a:r>
               <a:rPr lang="en-US" sz="1200" kern="0" dirty="0" err="1">
@@ -5249,7 +5336,7 @@
           <p:spPr>
             <a:xfrm>
               <a:off x="5466268" y="683946"/>
-              <a:ext cx="738445" cy="117102"/>
+              <a:ext cx="738445" cy="194389"/>
             </a:xfrm>
             <a:prstGeom prst="rect">
               <a:avLst/>
@@ -5359,7 +5446,15 @@
                     <a:sysClr val="windowText" lastClr="000000"/>
                   </a:solidFill>
                 </a:rPr>
-                <a:t>password protection</a:t>
+                <a:t>password protection on tables not ready for release in public-facing</a:t>
+              </a:r>
+              <a:r>
+                <a:rPr lang="en-US" sz="1100" kern="0" dirty="0">
+                  <a:solidFill>
+                    <a:sysClr val="windowText" lastClr="000000"/>
+                  </a:solidFill>
+                </a:rPr>
+                <a:t> GLIMS</a:t>
               </a:r>
               <a:endParaRPr kumimoji="0" lang="en-US" sz="1100" i="0" u="none" strike="noStrike" kern="0" cap="none" spc="0" normalizeH="0" baseline="0" noProof="0" dirty="0">
                 <a:ln>
@@ -5507,8 +5602,8 @@
         </p:nvCxnSpPr>
         <p:spPr>
           <a:xfrm flipV="1">
-            <a:off x="9843185" y="1669577"/>
-            <a:ext cx="410988" cy="1861390"/>
+            <a:off x="9758912" y="1669577"/>
+            <a:ext cx="495261" cy="1364786"/>
           </a:xfrm>
           <a:prstGeom prst="straightConnector1">
             <a:avLst/>
@@ -5541,15 +5636,14 @@
         <p:nvCxnSpPr>
           <p:cNvPr id="343" name="Straight Arrow Connector 342"/>
           <p:cNvCxnSpPr>
-            <a:stCxn id="334" idx="4"/>
             <a:endCxn id="332" idx="1"/>
           </p:cNvCxnSpPr>
           <p:nvPr/>
         </p:nvCxnSpPr>
         <p:spPr>
           <a:xfrm flipV="1">
-            <a:off x="9758912" y="3217296"/>
-            <a:ext cx="398507" cy="1340096"/>
+            <a:off x="7930531" y="3217296"/>
+            <a:ext cx="2226888" cy="56240"/>
           </a:xfrm>
           <a:prstGeom prst="straightConnector1">
             <a:avLst/>
@@ -5677,6 +5771,461 @@
           </a:p>
         </p:txBody>
       </p:sp>
+      <p:pic>
+        <p:nvPicPr>
+          <p:cNvPr id="1028" name="Picture 4" descr="Image result for aws logo"/>
+          <p:cNvPicPr>
+            <a:picLocks noChangeAspect="1" noChangeArrowheads="1"/>
+          </p:cNvPicPr>
+          <p:nvPr/>
+        </p:nvPicPr>
+        <p:blipFill>
+          <a:blip r:embed="rId9">
+            <a:extLst>
+              <a:ext uri="{28A0092B-C50C-407E-A947-70E740481C1C}">
+                <a14:useLocalDpi xmlns:a14="http://schemas.microsoft.com/office/drawing/2010/main" val="0"/>
+              </a:ext>
+            </a:extLst>
+          </a:blip>
+          <a:srcRect/>
+          <a:stretch>
+            <a:fillRect/>
+          </a:stretch>
+        </p:blipFill>
+        <p:spPr bwMode="auto">
+          <a:xfrm>
+            <a:off x="6080300" y="2752675"/>
+            <a:ext cx="996473" cy="398589"/>
+          </a:xfrm>
+          <a:prstGeom prst="rect">
+            <a:avLst/>
+          </a:prstGeom>
+          <a:noFill/>
+          <a:extLst>
+            <a:ext uri="{909E8E84-426E-40DD-AFC4-6F175D3DCCD1}">
+              <a14:hiddenFill xmlns:a14="http://schemas.microsoft.com/office/drawing/2010/main">
+                <a:solidFill>
+                  <a:srgbClr val="FFFFFF"/>
+                </a:solidFill>
+              </a14:hiddenFill>
+            </a:ext>
+          </a:extLst>
+        </p:spPr>
+      </p:pic>
+      <p:pic>
+        <p:nvPicPr>
+          <p:cNvPr id="3" name="Picture 2"/>
+          <p:cNvPicPr>
+            <a:picLocks noChangeAspect="1"/>
+          </p:cNvPicPr>
+          <p:nvPr/>
+        </p:nvPicPr>
+        <p:blipFill>
+          <a:blip r:embed="rId10"/>
+          <a:stretch>
+            <a:fillRect/>
+          </a:stretch>
+        </p:blipFill>
+        <p:spPr>
+          <a:xfrm>
+            <a:off x="8830012" y="2648287"/>
+            <a:ext cx="475449" cy="462018"/>
+          </a:xfrm>
+          <a:prstGeom prst="rect">
+            <a:avLst/>
+          </a:prstGeom>
+        </p:spPr>
+      </p:pic>
+      <p:pic>
+        <p:nvPicPr>
+          <p:cNvPr id="1030" name="Picture 6" descr="Image result for qgis logo"/>
+          <p:cNvPicPr>
+            <a:picLocks noChangeAspect="1" noChangeArrowheads="1"/>
+          </p:cNvPicPr>
+          <p:nvPr/>
+        </p:nvPicPr>
+        <p:blipFill>
+          <a:blip r:embed="rId11">
+            <a:extLst>
+              <a:ext uri="{28A0092B-C50C-407E-A947-70E740481C1C}">
+                <a14:useLocalDpi xmlns:a14="http://schemas.microsoft.com/office/drawing/2010/main" val="0"/>
+              </a:ext>
+            </a:extLst>
+          </a:blip>
+          <a:srcRect/>
+          <a:stretch>
+            <a:fillRect/>
+          </a:stretch>
+        </p:blipFill>
+        <p:spPr bwMode="auto">
+          <a:xfrm>
+            <a:off x="10610605" y="2272857"/>
+            <a:ext cx="428243" cy="471871"/>
+          </a:xfrm>
+          <a:prstGeom prst="rect">
+            <a:avLst/>
+          </a:prstGeom>
+          <a:noFill/>
+          <a:extLst>
+            <a:ext uri="{909E8E84-426E-40DD-AFC4-6F175D3DCCD1}">
+              <a14:hiddenFill xmlns:a14="http://schemas.microsoft.com/office/drawing/2010/main">
+                <a:solidFill>
+                  <a:srgbClr val="FFFFFF"/>
+                </a:solidFill>
+              </a14:hiddenFill>
+            </a:ext>
+          </a:extLst>
+        </p:spPr>
+      </p:pic>
+      <p:cxnSp>
+        <p:nvCxnSpPr>
+          <p:cNvPr id="55" name="Straight Arrow Connector 54"/>
+          <p:cNvCxnSpPr/>
+          <p:nvPr/>
+        </p:nvCxnSpPr>
+        <p:spPr>
+          <a:xfrm flipV="1">
+            <a:off x="7915520" y="1684986"/>
+            <a:ext cx="2299839" cy="1557052"/>
+          </a:xfrm>
+          <a:prstGeom prst="straightConnector1">
+            <a:avLst/>
+          </a:prstGeom>
+          <a:ln>
+            <a:solidFill>
+              <a:schemeClr val="accent1">
+                <a:lumMod val="50000"/>
+              </a:schemeClr>
+            </a:solidFill>
+            <a:tailEnd type="triangle"/>
+          </a:ln>
+        </p:spPr>
+        <p:style>
+          <a:lnRef idx="1">
+            <a:schemeClr val="accent1"/>
+          </a:lnRef>
+          <a:fillRef idx="0">
+            <a:schemeClr val="accent1"/>
+          </a:fillRef>
+          <a:effectRef idx="0">
+            <a:schemeClr val="accent1"/>
+          </a:effectRef>
+          <a:fontRef idx="minor">
+            <a:schemeClr val="tx1"/>
+          </a:fontRef>
+        </p:style>
+      </p:cxnSp>
+      <p:pic>
+        <p:nvPicPr>
+          <p:cNvPr id="1032" name="Picture 8" descr="Image result for matlab logo"/>
+          <p:cNvPicPr>
+            <a:picLocks noChangeAspect="1" noChangeArrowheads="1"/>
+          </p:cNvPicPr>
+          <p:nvPr/>
+        </p:nvPicPr>
+        <p:blipFill>
+          <a:blip r:embed="rId12">
+            <a:extLst>
+              <a:ext uri="{28A0092B-C50C-407E-A947-70E740481C1C}">
+                <a14:useLocalDpi xmlns:a14="http://schemas.microsoft.com/office/drawing/2010/main" val="0"/>
+              </a:ext>
+            </a:extLst>
+          </a:blip>
+          <a:srcRect/>
+          <a:stretch>
+            <a:fillRect/>
+          </a:stretch>
+        </p:blipFill>
+        <p:spPr bwMode="auto">
+          <a:xfrm>
+            <a:off x="10152090" y="3688866"/>
+            <a:ext cx="619500" cy="464625"/>
+          </a:xfrm>
+          <a:prstGeom prst="rect">
+            <a:avLst/>
+          </a:prstGeom>
+          <a:noFill/>
+          <a:extLst>
+            <a:ext uri="{909E8E84-426E-40DD-AFC4-6F175D3DCCD1}">
+              <a14:hiddenFill xmlns:a14="http://schemas.microsoft.com/office/drawing/2010/main">
+                <a:solidFill>
+                  <a:srgbClr val="FFFFFF"/>
+                </a:solidFill>
+              </a14:hiddenFill>
+            </a:ext>
+          </a:extLst>
+        </p:spPr>
+      </p:pic>
+      <p:pic>
+        <p:nvPicPr>
+          <p:cNvPr id="1034" name="Picture 10" descr="Image result for python logo"/>
+          <p:cNvPicPr>
+            <a:picLocks noChangeAspect="1" noChangeArrowheads="1"/>
+          </p:cNvPicPr>
+          <p:nvPr/>
+        </p:nvPicPr>
+        <p:blipFill>
+          <a:blip r:embed="rId13">
+            <a:extLst>
+              <a:ext uri="{28A0092B-C50C-407E-A947-70E740481C1C}">
+                <a14:useLocalDpi xmlns:a14="http://schemas.microsoft.com/office/drawing/2010/main" val="0"/>
+              </a:ext>
+            </a:extLst>
+          </a:blip>
+          <a:srcRect/>
+          <a:stretch>
+            <a:fillRect/>
+          </a:stretch>
+        </p:blipFill>
+        <p:spPr bwMode="auto">
+          <a:xfrm>
+            <a:off x="918008" y="326766"/>
+            <a:ext cx="927474" cy="463737"/>
+          </a:xfrm>
+          <a:prstGeom prst="rect">
+            <a:avLst/>
+          </a:prstGeom>
+          <a:noFill/>
+          <a:extLst>
+            <a:ext uri="{909E8E84-426E-40DD-AFC4-6F175D3DCCD1}">
+              <a14:hiddenFill xmlns:a14="http://schemas.microsoft.com/office/drawing/2010/main">
+                <a:solidFill>
+                  <a:srgbClr val="FFFFFF"/>
+                </a:solidFill>
+              </a14:hiddenFill>
+            </a:ext>
+          </a:extLst>
+        </p:spPr>
+      </p:pic>
+      <p:pic>
+        <p:nvPicPr>
+          <p:cNvPr id="61" name="Picture 8" descr="Image result for matlab logo"/>
+          <p:cNvPicPr>
+            <a:picLocks noChangeAspect="1" noChangeArrowheads="1"/>
+          </p:cNvPicPr>
+          <p:nvPr/>
+        </p:nvPicPr>
+        <p:blipFill>
+          <a:blip r:embed="rId12">
+            <a:extLst>
+              <a:ext uri="{28A0092B-C50C-407E-A947-70E740481C1C}">
+                <a14:useLocalDpi xmlns:a14="http://schemas.microsoft.com/office/drawing/2010/main" val="0"/>
+              </a:ext>
+            </a:extLst>
+          </a:blip>
+          <a:srcRect/>
+          <a:stretch>
+            <a:fillRect/>
+          </a:stretch>
+        </p:blipFill>
+        <p:spPr bwMode="auto">
+          <a:xfrm>
+            <a:off x="1607208" y="282915"/>
+            <a:ext cx="619500" cy="464625"/>
+          </a:xfrm>
+          <a:prstGeom prst="rect">
+            <a:avLst/>
+          </a:prstGeom>
+          <a:noFill/>
+          <a:extLst>
+            <a:ext uri="{909E8E84-426E-40DD-AFC4-6F175D3DCCD1}">
+              <a14:hiddenFill xmlns:a14="http://schemas.microsoft.com/office/drawing/2010/main">
+                <a:solidFill>
+                  <a:srgbClr val="FFFFFF"/>
+                </a:solidFill>
+              </a14:hiddenFill>
+            </a:ext>
+          </a:extLst>
+        </p:spPr>
+      </p:pic>
+      <p:pic>
+        <p:nvPicPr>
+          <p:cNvPr id="62" name="Picture 10" descr="Image result for python logo"/>
+          <p:cNvPicPr>
+            <a:picLocks noChangeAspect="1" noChangeArrowheads="1"/>
+          </p:cNvPicPr>
+          <p:nvPr/>
+        </p:nvPicPr>
+        <p:blipFill>
+          <a:blip r:embed="rId13">
+            <a:extLst>
+              <a:ext uri="{28A0092B-C50C-407E-A947-70E740481C1C}">
+                <a14:useLocalDpi xmlns:a14="http://schemas.microsoft.com/office/drawing/2010/main" val="0"/>
+              </a:ext>
+            </a:extLst>
+          </a:blip>
+          <a:srcRect/>
+          <a:stretch>
+            <a:fillRect/>
+          </a:stretch>
+        </p:blipFill>
+        <p:spPr bwMode="auto">
+          <a:xfrm>
+            <a:off x="20942634" y="7714198"/>
+            <a:ext cx="356796" cy="178398"/>
+          </a:xfrm>
+          <a:prstGeom prst="rect">
+            <a:avLst/>
+          </a:prstGeom>
+          <a:noFill/>
+          <a:extLst>
+            <a:ext uri="{909E8E84-426E-40DD-AFC4-6F175D3DCCD1}">
+              <a14:hiddenFill xmlns:a14="http://schemas.microsoft.com/office/drawing/2010/main">
+                <a:solidFill>
+                  <a:srgbClr val="FFFFFF"/>
+                </a:solidFill>
+              </a14:hiddenFill>
+            </a:ext>
+          </a:extLst>
+        </p:spPr>
+      </p:pic>
+      <p:pic>
+        <p:nvPicPr>
+          <p:cNvPr id="1036" name="Picture 12" descr="Image result for arcgis logo"/>
+          <p:cNvPicPr>
+            <a:picLocks noChangeAspect="1" noChangeArrowheads="1"/>
+          </p:cNvPicPr>
+          <p:nvPr/>
+        </p:nvPicPr>
+        <p:blipFill>
+          <a:blip r:embed="rId14">
+            <a:extLst>
+              <a:ext uri="{28A0092B-C50C-407E-A947-70E740481C1C}">
+                <a14:useLocalDpi xmlns:a14="http://schemas.microsoft.com/office/drawing/2010/main" val="0"/>
+              </a:ext>
+            </a:extLst>
+          </a:blip>
+          <a:srcRect/>
+          <a:stretch>
+            <a:fillRect/>
+          </a:stretch>
+        </p:blipFill>
+        <p:spPr bwMode="auto">
+          <a:xfrm>
+            <a:off x="10948702" y="2252162"/>
+            <a:ext cx="549635" cy="549635"/>
+          </a:xfrm>
+          <a:prstGeom prst="rect">
+            <a:avLst/>
+          </a:prstGeom>
+          <a:noFill/>
+          <a:extLst>
+            <a:ext uri="{909E8E84-426E-40DD-AFC4-6F175D3DCCD1}">
+              <a14:hiddenFill xmlns:a14="http://schemas.microsoft.com/office/drawing/2010/main">
+                <a:solidFill>
+                  <a:srgbClr val="FFFFFF"/>
+                </a:solidFill>
+              </a14:hiddenFill>
+            </a:ext>
+          </a:extLst>
+        </p:spPr>
+      </p:pic>
+      <p:pic>
+        <p:nvPicPr>
+          <p:cNvPr id="64" name="Picture 10" descr="Image result for python logo"/>
+          <p:cNvPicPr>
+            <a:picLocks noChangeAspect="1" noChangeArrowheads="1"/>
+          </p:cNvPicPr>
+          <p:nvPr/>
+        </p:nvPicPr>
+        <p:blipFill>
+          <a:blip r:embed="rId13">
+            <a:extLst>
+              <a:ext uri="{28A0092B-C50C-407E-A947-70E740481C1C}">
+                <a14:useLocalDpi xmlns:a14="http://schemas.microsoft.com/office/drawing/2010/main" val="0"/>
+              </a:ext>
+            </a:extLst>
+          </a:blip>
+          <a:srcRect/>
+          <a:stretch>
+            <a:fillRect/>
+          </a:stretch>
+        </p:blipFill>
+        <p:spPr bwMode="auto">
+          <a:xfrm>
+            <a:off x="10501033" y="3715267"/>
+            <a:ext cx="927474" cy="463737"/>
+          </a:xfrm>
+          <a:prstGeom prst="rect">
+            <a:avLst/>
+          </a:prstGeom>
+          <a:noFill/>
+          <a:extLst>
+            <a:ext uri="{909E8E84-426E-40DD-AFC4-6F175D3DCCD1}">
+              <a14:hiddenFill xmlns:a14="http://schemas.microsoft.com/office/drawing/2010/main">
+                <a:solidFill>
+                  <a:srgbClr val="FFFFFF"/>
+                </a:solidFill>
+              </a14:hiddenFill>
+            </a:ext>
+          </a:extLst>
+        </p:spPr>
+      </p:pic>
+      <p:pic>
+        <p:nvPicPr>
+          <p:cNvPr id="65" name="Picture 2" descr="File:NASA logo.svg"/>
+          <p:cNvPicPr>
+            <a:picLocks noChangeAspect="1" noChangeArrowheads="1"/>
+          </p:cNvPicPr>
+          <p:nvPr/>
+        </p:nvPicPr>
+        <p:blipFill>
+          <a:blip r:embed="rId7" cstate="print">
+            <a:extLst>
+              <a:ext uri="{28A0092B-C50C-407E-A947-70E740481C1C}">
+                <a14:useLocalDpi xmlns:a14="http://schemas.microsoft.com/office/drawing/2010/main" val="0"/>
+              </a:ext>
+            </a:extLst>
+          </a:blip>
+          <a:srcRect/>
+          <a:stretch>
+            <a:fillRect/>
+          </a:stretch>
+        </p:blipFill>
+        <p:spPr bwMode="auto">
+          <a:xfrm>
+            <a:off x="3806118" y="5586412"/>
+            <a:ext cx="576247" cy="476895"/>
+          </a:xfrm>
+          <a:prstGeom prst="rect">
+            <a:avLst/>
+          </a:prstGeom>
+          <a:noFill/>
+          <a:extLst>
+            <a:ext uri="{909E8E84-426E-40DD-AFC4-6F175D3DCCD1}">
+              <a14:hiddenFill xmlns:a14="http://schemas.microsoft.com/office/drawing/2010/main">
+                <a:solidFill>
+                  <a:srgbClr val="FFFFFF"/>
+                </a:solidFill>
+              </a14:hiddenFill>
+            </a:ext>
+          </a:extLst>
+        </p:spPr>
+      </p:pic>
+      <p:pic>
+        <p:nvPicPr>
+          <p:cNvPr id="16" name="Picture 15"/>
+          <p:cNvPicPr>
+            <a:picLocks noChangeAspect="1"/>
+          </p:cNvPicPr>
+          <p:nvPr/>
+        </p:nvPicPr>
+        <p:blipFill>
+          <a:blip r:embed="rId15"/>
+          <a:stretch>
+            <a:fillRect/>
+          </a:stretch>
+        </p:blipFill>
+        <p:spPr>
+          <a:xfrm>
+            <a:off x="383541" y="535570"/>
+            <a:ext cx="725393" cy="167474"/>
+          </a:xfrm>
+          <a:prstGeom prst="rect">
+            <a:avLst/>
+          </a:prstGeom>
+        </p:spPr>
+      </p:pic>
     </p:spTree>
     <p:extLst>
       <p:ext uri="{BB962C8B-B14F-4D97-AF65-F5344CB8AC3E}">

</xml_diff>

<commit_message>
clean up ADAPT intro; add Linux and Windows VM lessons
</commit_message>
<xml_diff>
--- a/files/himatDataDiagram.pptx
+++ b/files/himatDataDiagram.pptx
@@ -3300,7 +3300,7 @@
               <a:defRPr/>
             </a:pPr>
             <a:r>
-              <a:rPr kumimoji="0" lang="en-US" sz="1200" b="1" i="0" u="none" strike="noStrike" kern="0" cap="none" spc="0" normalizeH="0" baseline="0" noProof="0" dirty="0">
+              <a:rPr kumimoji="0" lang="en-US" sz="1200" b="1" i="0" u="none" strike="noStrike" kern="0" cap="none" spc="0" normalizeH="0" baseline="0" noProof="0">
                 <a:ln>
                   <a:noFill/>
                 </a:ln>
@@ -3358,7 +3358,7 @@
               <a:defRPr/>
             </a:pPr>
             <a:r>
-              <a:rPr kumimoji="0" lang="en-US" sz="1200" i="0" u="none" strike="noStrike" kern="0" cap="none" spc="0" normalizeH="0" baseline="0" noProof="0" dirty="0" err="1">
+              <a:rPr kumimoji="0" lang="en-US" sz="1200" i="0" u="none" strike="noStrike" kern="0" cap="none" spc="0" normalizeH="0" baseline="0" noProof="0">
                 <a:ln>
                   <a:noFill/>
                 </a:ln>
@@ -3369,21 +3369,7 @@
                 <a:uLnTx/>
                 <a:uFillTx/>
               </a:rPr>
-              <a:t>e.g</a:t>
-            </a:r>
-            <a:r>
-              <a:rPr kumimoji="0" lang="en-US" sz="1200" i="0" u="none" strike="noStrike" kern="0" cap="none" spc="0" normalizeH="0" baseline="0" noProof="0" dirty="0">
-                <a:ln>
-                  <a:noFill/>
-                </a:ln>
-                <a:solidFill>
-                  <a:sysClr val="windowText" lastClr="000000"/>
-                </a:solidFill>
-                <a:effectLst/>
-                <a:uLnTx/>
-                <a:uFillTx/>
-              </a:rPr>
-              <a:t> remote sensing data; climate grids</a:t>
+              <a:t>e.g remote sensing data; climate grids</a:t>
             </a:r>
           </a:p>
         </p:txBody>
@@ -3428,7 +3414,7 @@
               <a:defRPr/>
             </a:pPr>
             <a:r>
-              <a:rPr kumimoji="0" lang="en-US" sz="1200" b="1" i="0" u="none" strike="noStrike" kern="0" cap="none" spc="0" normalizeH="0" baseline="0" noProof="0" dirty="0">
+              <a:rPr kumimoji="0" lang="en-US" sz="1200" b="1" i="0" u="none" strike="noStrike" kern="0" cap="none" spc="0" normalizeH="0" baseline="0" noProof="0">
                 <a:ln>
                   <a:noFill/>
                 </a:ln>
@@ -3444,7 +3430,7 @@
               <a:t>Vector (point,</a:t>
             </a:r>
             <a:r>
-              <a:rPr kumimoji="0" lang="en-US" sz="1200" b="1" i="0" u="none" strike="noStrike" kern="0" cap="none" spc="0" normalizeH="0" noProof="0" dirty="0">
+              <a:rPr kumimoji="0" lang="en-US" sz="1200" b="1" i="0" u="none" strike="noStrike" kern="0" cap="none" spc="0" normalizeH="0" noProof="0">
                 <a:ln>
                   <a:noFill/>
                 </a:ln>
@@ -3459,7 +3445,7 @@
               </a:rPr>
               <a:t> line, polygon)</a:t>
             </a:r>
-            <a:endParaRPr kumimoji="0" lang="en-US" sz="1200" b="1" i="0" u="none" strike="noStrike" kern="0" cap="none" spc="0" normalizeH="0" baseline="0" noProof="0" dirty="0">
+            <a:endParaRPr kumimoji="0" lang="en-US" sz="1200" b="1" i="0" u="none" strike="noStrike" kern="0" cap="none" spc="0" normalizeH="0" baseline="0" noProof="0">
               <a:ln>
                 <a:noFill/>
               </a:ln>
@@ -3515,7 +3501,7 @@
               <a:defRPr/>
             </a:pPr>
             <a:r>
-              <a:rPr lang="en-US" sz="1200" b="1" kern="0" dirty="0">
+              <a:rPr lang="en-US" sz="1200" b="1" kern="0">
                 <a:solidFill>
                   <a:schemeClr val="accent2">
                     <a:lumMod val="75000"/>
@@ -3603,7 +3589,7 @@
               <a:defRPr/>
             </a:pPr>
             <a:r>
-              <a:rPr kumimoji="0" lang="en-US" sz="1200" i="0" u="none" strike="noStrike" kern="0" cap="none" spc="0" normalizeH="0" baseline="0" noProof="0" dirty="0">
+              <a:rPr kumimoji="0" lang="en-US" sz="1200" i="0" u="none" strike="noStrike" kern="0" cap="none" spc="0" normalizeH="0" baseline="0" noProof="0">
                 <a:ln>
                   <a:noFill/>
                 </a:ln>
@@ -3617,7 +3603,7 @@
               <a:t>rivers; glacier</a:t>
             </a:r>
             <a:r>
-              <a:rPr kumimoji="0" lang="en-US" sz="1200" i="0" u="none" strike="noStrike" kern="0" cap="none" spc="0" normalizeH="0" noProof="0" dirty="0">
+              <a:rPr kumimoji="0" lang="en-US" sz="1200" i="0" u="none" strike="noStrike" kern="0" cap="none" spc="0" normalizeH="0" noProof="0">
                 <a:ln>
                   <a:noFill/>
                 </a:ln>
@@ -3630,7 +3616,7 @@
               </a:rPr>
               <a:t> polygons, weather station locations</a:t>
             </a:r>
-            <a:endParaRPr kumimoji="0" lang="en-US" sz="1200" i="0" u="none" strike="noStrike" kern="0" cap="none" spc="0" normalizeH="0" baseline="0" noProof="0" dirty="0">
+            <a:endParaRPr kumimoji="0" lang="en-US" sz="1200" i="0" u="none" strike="noStrike" kern="0" cap="none" spc="0" normalizeH="0" baseline="0" noProof="0">
               <a:ln>
                 <a:noFill/>
               </a:ln>
@@ -3684,7 +3670,7 @@
               <a:defRPr/>
             </a:pPr>
             <a:r>
-              <a:rPr kumimoji="0" lang="en-US" sz="1200" i="0" u="none" strike="noStrike" kern="0" cap="none" spc="0" normalizeH="0" baseline="0" noProof="0" dirty="0">
+              <a:rPr kumimoji="0" lang="en-US" sz="1200" i="0" u="none" strike="noStrike" kern="0" cap="none" spc="0" normalizeH="0" baseline="0" noProof="0">
                 <a:ln>
                   <a:noFill/>
                 </a:ln>
@@ -3709,9 +3695,9 @@
         <p:grpSpPr>
           <a:xfrm>
             <a:off x="2994524" y="2514041"/>
-            <a:ext cx="3445770" cy="2255909"/>
+            <a:ext cx="3445770" cy="1999793"/>
             <a:chOff x="5696726" y="703627"/>
-            <a:chExt cx="854457" cy="752859"/>
+            <a:chExt cx="854457" cy="667386"/>
           </a:xfrm>
         </p:grpSpPr>
         <p:sp>
@@ -3773,7 +3759,7 @@
                 <a:tabLst/>
                 <a:defRPr/>
               </a:pPr>
-              <a:endParaRPr kumimoji="0" lang="en-US" sz="1800" b="0" i="0" u="none" strike="noStrike" kern="0" cap="none" spc="0" normalizeH="0" baseline="0" noProof="0" dirty="0">
+              <a:endParaRPr kumimoji="0" lang="en-US" sz="1800" b="0" i="0" u="none" strike="noStrike" kern="0" cap="none" spc="0" normalizeH="0" baseline="0" noProof="0">
                 <a:ln>
                   <a:noFill/>
                 </a:ln>
@@ -3796,7 +3782,7 @@
           <p:spPr>
             <a:xfrm>
               <a:off x="5696726" y="860748"/>
-              <a:ext cx="854457" cy="595738"/>
+              <a:ext cx="854457" cy="426261"/>
             </a:xfrm>
             <a:prstGeom prst="rect">
               <a:avLst/>
@@ -3827,7 +3813,7 @@
                 <a:defRPr/>
               </a:pPr>
               <a:r>
-                <a:rPr lang="en-US" sz="1100" b="1" kern="0" noProof="0" dirty="0">
+                <a:rPr lang="en-US" sz="1100" b="1" kern="0" noProof="0">
                   <a:solidFill>
                     <a:sysClr val="windowText" lastClr="000000"/>
                   </a:solidFill>
@@ -3852,7 +3838,7 @@
                 <a:defRPr/>
               </a:pPr>
               <a:r>
-                <a:rPr lang="en-US" sz="1100" kern="0" dirty="0">
+                <a:rPr lang="en-US" sz="1100" kern="0">
                   <a:solidFill>
                     <a:sysClr val="windowText" lastClr="000000"/>
                   </a:solidFill>
@@ -3877,23 +3863,15 @@
                 <a:defRPr/>
               </a:pPr>
               <a:r>
-                <a:rPr lang="en-US" sz="1100" kern="0" noProof="0" dirty="0">
+                <a:rPr lang="en-US" sz="1100" kern="0" noProof="0">
                   <a:solidFill>
                     <a:sysClr val="windowText" lastClr="000000"/>
                   </a:solidFill>
                 </a:rPr>
-                <a:t>-&gt; </a:t>
+                <a:t>-&gt; es</a:t>
               </a:r>
               <a:r>
-                <a:rPr lang="en-US" sz="1100" kern="0" noProof="0" dirty="0" err="1">
-                  <a:solidFill>
-                    <a:sysClr val="windowText" lastClr="000000"/>
-                  </a:solidFill>
-                </a:rPr>
-                <a:t>es</a:t>
-              </a:r>
-              <a:r>
-                <a:rPr lang="en-US" sz="1100" kern="0" dirty="0" err="1">
+                <a:rPr lang="en-US" sz="1100" kern="0" err="1">
                   <a:solidFill>
                     <a:sysClr val="windowText" lastClr="000000"/>
                   </a:solidFill>
@@ -3901,7 +3879,7 @@
                 <a:t>pecially</a:t>
               </a:r>
               <a:r>
-                <a:rPr lang="en-US" sz="1100" kern="0" dirty="0">
+                <a:rPr lang="en-US" sz="1100" kern="0">
                   <a:solidFill>
                     <a:sysClr val="windowText" lastClr="000000"/>
                   </a:solidFill>
@@ -3926,7 +3904,7 @@
                 <a:defRPr/>
               </a:pPr>
               <a:r>
-                <a:rPr lang="en-US" sz="1100" kern="0" dirty="0">
+                <a:rPr lang="en-US" sz="1100" kern="0">
                   <a:solidFill>
                     <a:sysClr val="windowText" lastClr="000000"/>
                   </a:solidFill>
@@ -3951,14 +3929,14 @@
                 <a:defRPr/>
               </a:pPr>
               <a:r>
-                <a:rPr lang="en-US" sz="1100" kern="0" dirty="0">
+                <a:rPr lang="en-US" sz="1100" kern="0">
                   <a:solidFill>
                     <a:sysClr val="windowText" lastClr="000000"/>
                   </a:solidFill>
                 </a:rPr>
                 <a:t>-&gt; only approved HiMAT members can access </a:t>
               </a:r>
-              <a:endParaRPr lang="en-US" sz="1100" kern="0" noProof="0" dirty="0">
+              <a:endParaRPr lang="en-US" sz="1100" kern="0" noProof="0">
                 <a:solidFill>
                   <a:sysClr val="windowText" lastClr="000000"/>
                 </a:solidFill>
@@ -3982,7 +3960,7 @@
                 <a:tabLst/>
                 <a:defRPr/>
               </a:pPr>
-              <a:endParaRPr lang="en-US" sz="1100" b="1" kern="0" noProof="0" dirty="0">
+              <a:endParaRPr lang="en-US" sz="1100" b="1" kern="0" noProof="0">
                 <a:solidFill>
                   <a:sysClr val="windowText" lastClr="000000"/>
                 </a:solidFill>
@@ -4006,7 +3984,7 @@
                 <a:tabLst/>
                 <a:defRPr/>
               </a:pPr>
-              <a:endParaRPr kumimoji="0" lang="en-US" sz="1100" b="1" i="0" u="none" strike="noStrike" kern="0" cap="none" spc="0" normalizeH="0" baseline="0" noProof="0" dirty="0">
+              <a:endParaRPr kumimoji="0" lang="en-US" sz="1100" b="1" i="0" u="none" strike="noStrike" kern="0" cap="none" spc="0" normalizeH="0" baseline="0" noProof="0">
                 <a:ln>
                   <a:noFill/>
                 </a:ln>
@@ -4140,7 +4118,7 @@
                 <a:tabLst/>
                 <a:defRPr/>
               </a:pPr>
-              <a:endParaRPr kumimoji="0" lang="en-US" sz="1800" b="0" i="0" u="none" strike="noStrike" kern="0" cap="none" spc="0" normalizeH="0" baseline="0" noProof="0" dirty="0">
+              <a:endParaRPr kumimoji="0" lang="en-US" sz="1800" b="0" i="0" u="none" strike="noStrike" kern="0" cap="none" spc="0" normalizeH="0" baseline="0" noProof="0">
                 <a:ln>
                   <a:noFill/>
                 </a:ln>
@@ -4194,7 +4172,7 @@
                 <a:defRPr/>
               </a:pPr>
               <a:r>
-                <a:rPr kumimoji="0" lang="en-US" sz="1100" b="1" i="0" u="none" strike="noStrike" kern="0" cap="none" spc="0" normalizeH="0" baseline="0" noProof="0" dirty="0">
+                <a:rPr kumimoji="0" lang="en-US" sz="1100" b="1" i="0" u="none" strike="noStrike" kern="0" cap="none" spc="0" normalizeH="0" baseline="0" noProof="0">
                   <a:ln>
                     <a:noFill/>
                   </a:ln>
@@ -4227,7 +4205,7 @@
                 <a:defRPr/>
               </a:pPr>
               <a:r>
-                <a:rPr lang="en-US" sz="1100" kern="0" dirty="0">
+                <a:rPr lang="en-US" sz="1100" kern="0">
                   <a:solidFill>
                     <a:sysClr val="windowText" lastClr="000000"/>
                   </a:solidFill>
@@ -4254,7 +4232,7 @@
                 <a:defRPr/>
               </a:pPr>
               <a:r>
-                <a:rPr kumimoji="0" lang="en-US" sz="1100" i="0" u="none" strike="noStrike" kern="0" cap="none" spc="0" normalizeH="0" baseline="0" noProof="0" dirty="0">
+                <a:rPr kumimoji="0" lang="en-US" sz="1100" i="0" u="none" strike="noStrike" kern="0" cap="none" spc="0" normalizeH="0" baseline="0" noProof="0">
                   <a:ln>
                     <a:noFill/>
                   </a:ln>
@@ -4268,7 +4246,7 @@
                 <a:t>-&gt;</a:t>
               </a:r>
               <a:r>
-                <a:rPr kumimoji="0" lang="en-US" sz="1100" i="0" u="none" strike="noStrike" kern="0" cap="none" spc="0" normalizeH="0" noProof="0" dirty="0">
+                <a:rPr kumimoji="0" lang="en-US" sz="1100" i="0" u="none" strike="noStrike" kern="0" cap="none" spc="0" normalizeH="0" noProof="0">
                   <a:ln>
                     <a:noFill/>
                   </a:ln>
@@ -4281,7 +4259,7 @@
                 </a:rPr>
                 <a:t> detailed metadata</a:t>
               </a:r>
-              <a:endParaRPr kumimoji="0" lang="en-US" sz="1100" i="0" u="none" strike="noStrike" kern="0" cap="none" spc="0" normalizeH="0" baseline="0" noProof="0" dirty="0">
+              <a:endParaRPr kumimoji="0" lang="en-US" sz="1100" i="0" u="none" strike="noStrike" kern="0" cap="none" spc="0" normalizeH="0" baseline="0" noProof="0">
                 <a:ln>
                   <a:noFill/>
                 </a:ln>
@@ -4345,7 +4323,7 @@
               <a:defRPr/>
             </a:pPr>
             <a:r>
-              <a:rPr kumimoji="0" lang="en-US" sz="1200" b="0" i="0" u="none" strike="noStrike" kern="0" cap="none" spc="0" normalizeH="0" baseline="0" noProof="0" dirty="0">
+              <a:rPr kumimoji="0" lang="en-US" sz="1200" b="0" i="0" u="none" strike="noStrike" kern="0" cap="none" spc="0" normalizeH="0" baseline="0" noProof="0">
                 <a:ln>
                   <a:noFill/>
                 </a:ln>
@@ -4378,14 +4356,14 @@
               <a:defRPr/>
             </a:pPr>
             <a:r>
-              <a:rPr lang="en-US" sz="1200" kern="0" dirty="0">
+              <a:rPr lang="en-US" sz="1200" kern="0">
                 <a:solidFill>
                   <a:sysClr val="windowText" lastClr="000000"/>
                 </a:solidFill>
               </a:rPr>
               <a:t>-&gt; preliminary products; not for distribution; needs QC</a:t>
             </a:r>
-            <a:endParaRPr kumimoji="0" lang="en-US" sz="1200" b="0" i="0" u="none" strike="noStrike" kern="0" cap="none" spc="0" normalizeH="0" baseline="0" noProof="0" dirty="0">
+            <a:endParaRPr kumimoji="0" lang="en-US" sz="1200" b="0" i="0" u="none" strike="noStrike" kern="0" cap="none" spc="0" normalizeH="0" baseline="0" noProof="0">
               <a:ln>
                 <a:noFill/>
               </a:ln>
@@ -4448,7 +4426,7 @@
               <a:defRPr/>
             </a:pPr>
             <a:r>
-              <a:rPr lang="en-US" sz="1200" b="1" kern="0" dirty="0">
+              <a:rPr lang="en-US" sz="1200" b="1" kern="0">
                 <a:solidFill>
                   <a:sysClr val="windowText" lastClr="000000"/>
                 </a:solidFill>
@@ -4475,14 +4453,14 @@
               <a:defRPr/>
             </a:pPr>
             <a:r>
-              <a:rPr lang="en-US" sz="1200" kern="0" dirty="0">
+              <a:rPr lang="en-US" sz="1200" kern="0">
                 <a:solidFill>
                   <a:sysClr val="windowText" lastClr="000000"/>
                 </a:solidFill>
               </a:rPr>
               <a:t>run scripts to operate on data directly within ADAPT</a:t>
             </a:r>
-            <a:endParaRPr kumimoji="0" lang="en-US" sz="1200" i="0" u="none" strike="noStrike" kern="0" cap="none" spc="0" normalizeH="0" baseline="0" noProof="0" dirty="0">
+            <a:endParaRPr kumimoji="0" lang="en-US" sz="1200" i="0" u="none" strike="noStrike" kern="0" cap="none" spc="0" normalizeH="0" baseline="0" noProof="0">
               <a:ln>
                 <a:noFill/>
               </a:ln>
@@ -4576,7 +4554,7 @@
               <a:defRPr/>
             </a:pPr>
             <a:r>
-              <a:rPr lang="en-US" sz="1200" b="1" kern="0" dirty="0">
+              <a:rPr lang="en-US" sz="1200" b="1" kern="0">
                 <a:solidFill>
                   <a:sysClr val="windowText" lastClr="000000"/>
                 </a:solidFill>
@@ -4603,7 +4581,7 @@
               <a:defRPr/>
             </a:pPr>
             <a:r>
-              <a:rPr lang="en-US" sz="1200" kern="0" dirty="0">
+              <a:rPr lang="en-US" sz="1200" kern="0">
                 <a:solidFill>
                   <a:sysClr val="windowText" lastClr="000000"/>
                 </a:solidFill>
@@ -4630,7 +4608,7 @@
               <a:defRPr/>
             </a:pPr>
             <a:r>
-              <a:rPr kumimoji="0" lang="en-US" sz="1200" i="0" u="none" strike="noStrike" kern="0" cap="none" spc="0" normalizeH="0" baseline="0" noProof="0" dirty="0">
+              <a:rPr kumimoji="0" lang="en-US" sz="1200" i="0" u="none" strike="noStrike" kern="0" cap="none" spc="0" normalizeH="0" baseline="0" noProof="0">
                 <a:ln>
                   <a:noFill/>
                 </a:ln>
@@ -4735,7 +4713,7 @@
               <a:defRPr/>
             </a:pPr>
             <a:r>
-              <a:rPr lang="en-US" sz="1200" b="1" kern="0" dirty="0">
+              <a:rPr lang="en-US" sz="1200" b="1" kern="0">
                 <a:solidFill>
                   <a:sysClr val="windowText" lastClr="000000"/>
                 </a:solidFill>
@@ -4762,14 +4740,14 @@
               <a:defRPr/>
             </a:pPr>
             <a:r>
-              <a:rPr lang="en-US" sz="1200" kern="0" dirty="0">
+              <a:rPr lang="en-US" sz="1200" kern="0">
                 <a:solidFill>
                   <a:sysClr val="windowText" lastClr="000000"/>
                 </a:solidFill>
               </a:rPr>
               <a:t>download files from himat.org and nsidc.org using web map interface</a:t>
             </a:r>
-            <a:endParaRPr kumimoji="0" lang="en-US" sz="1200" i="0" u="none" strike="noStrike" kern="0" cap="none" spc="0" normalizeH="0" baseline="0" noProof="0" dirty="0">
+            <a:endParaRPr kumimoji="0" lang="en-US" sz="1200" i="0" u="none" strike="noStrike" kern="0" cap="none" spc="0" normalizeH="0" baseline="0" noProof="0">
               <a:ln>
                 <a:noFill/>
               </a:ln>
@@ -4861,7 +4839,7 @@
                 <a:tabLst/>
                 <a:defRPr/>
               </a:pPr>
-              <a:endParaRPr kumimoji="0" lang="en-US" sz="1800" b="0" i="0" u="none" strike="noStrike" kern="0" cap="none" spc="0" normalizeH="0" baseline="0" noProof="0" dirty="0">
+              <a:endParaRPr kumimoji="0" lang="en-US" sz="1800" b="0" i="0" u="none" strike="noStrike" kern="0" cap="none" spc="0" normalizeH="0" baseline="0" noProof="0">
                 <a:ln>
                   <a:noFill/>
                 </a:ln>
@@ -4915,7 +4893,7 @@
                 <a:defRPr/>
               </a:pPr>
               <a:r>
-                <a:rPr lang="en-US" sz="1100" b="1" kern="0" dirty="0">
+                <a:rPr lang="en-US" sz="1100" b="1" kern="0">
                   <a:solidFill>
                     <a:sysClr val="windowText" lastClr="000000"/>
                   </a:solidFill>
@@ -4942,7 +4920,7 @@
                 <a:defRPr/>
               </a:pPr>
               <a:r>
-                <a:rPr kumimoji="0" lang="en-US" sz="1100" i="0" u="none" strike="noStrike" kern="0" cap="none" spc="0" normalizeH="0" baseline="0" noProof="0" dirty="0">
+                <a:rPr kumimoji="0" lang="en-US" sz="1100" i="0" u="none" strike="noStrike" kern="0" cap="none" spc="0" normalizeH="0" baseline="0" noProof="0">
                   <a:ln>
                     <a:noFill/>
                   </a:ln>
@@ -4956,7 +4934,7 @@
                 <a:t>the</a:t>
               </a:r>
               <a:r>
-                <a:rPr kumimoji="0" lang="en-US" sz="1100" i="0" u="none" strike="noStrike" kern="0" cap="none" spc="0" normalizeH="0" noProof="0" dirty="0">
+                <a:rPr kumimoji="0" lang="en-US" sz="1100" i="0" u="none" strike="noStrike" kern="0" cap="none" spc="0" normalizeH="0" noProof="0">
                   <a:ln>
                     <a:noFill/>
                   </a:ln>
@@ -4989,7 +4967,7 @@
                 <a:defRPr/>
               </a:pPr>
               <a:r>
-                <a:rPr lang="en-US" sz="1100" kern="0" baseline="0" dirty="0">
+                <a:rPr lang="en-US" sz="1100" kern="0" baseline="0">
                   <a:solidFill>
                     <a:sysClr val="windowText" lastClr="000000"/>
                   </a:solidFill>
@@ -4997,14 +4975,14 @@
                 <a:t>password protection on tables not ready for release in public-facing</a:t>
               </a:r>
               <a:r>
-                <a:rPr lang="en-US" sz="1100" kern="0" dirty="0">
+                <a:rPr lang="en-US" sz="1100" kern="0">
                   <a:solidFill>
                     <a:sysClr val="windowText" lastClr="000000"/>
                   </a:solidFill>
                 </a:rPr>
                 <a:t> GLIMS</a:t>
               </a:r>
-              <a:endParaRPr kumimoji="0" lang="en-US" sz="1100" i="0" u="none" strike="noStrike" kern="0" cap="none" spc="0" normalizeH="0" baseline="0" noProof="0" dirty="0">
+              <a:endParaRPr kumimoji="0" lang="en-US" sz="1100" i="0" u="none" strike="noStrike" kern="0" cap="none" spc="0" normalizeH="0" baseline="0" noProof="0">
                 <a:ln>
                   <a:noFill/>
                 </a:ln>
@@ -5068,7 +5046,7 @@
               <a:defRPr/>
             </a:pPr>
             <a:r>
-              <a:rPr lang="en-US" sz="1200" b="1" kern="0" dirty="0">
+              <a:rPr lang="en-US" sz="1200" b="1" kern="0">
                 <a:solidFill>
                   <a:sysClr val="windowText" lastClr="000000"/>
                 </a:solidFill>
@@ -5095,7 +5073,7 @@
               <a:defRPr/>
             </a:pPr>
             <a:r>
-              <a:rPr lang="en-US" sz="1200" kern="0" dirty="0">
+              <a:rPr lang="en-US" sz="1200" kern="0">
                 <a:solidFill>
                   <a:sysClr val="windowText" lastClr="000000"/>
                 </a:solidFill>
@@ -5103,7 +5081,7 @@
               <a:t>access data directly from remote GIS software, </a:t>
             </a:r>
             <a:r>
-              <a:rPr lang="en-US" sz="1200" kern="0" dirty="0" err="1">
+              <a:rPr lang="en-US" sz="1200" kern="0" err="1">
                 <a:solidFill>
                   <a:sysClr val="windowText" lastClr="000000"/>
                 </a:solidFill>
@@ -5111,14 +5089,14 @@
               <a:t>Matlab</a:t>
             </a:r>
             <a:r>
-              <a:rPr lang="en-US" sz="1200" kern="0" dirty="0">
+              <a:rPr lang="en-US" sz="1200" kern="0">
                 <a:solidFill>
                   <a:sysClr val="windowText" lastClr="000000"/>
                 </a:solidFill>
               </a:rPr>
               <a:t>/Python scripts</a:t>
             </a:r>
-            <a:endParaRPr kumimoji="0" lang="en-US" sz="1200" i="0" u="none" strike="noStrike" kern="0" cap="none" spc="0" normalizeH="0" baseline="0" noProof="0" dirty="0">
+            <a:endParaRPr kumimoji="0" lang="en-US" sz="1200" i="0" u="none" strike="noStrike" kern="0" cap="none" spc="0" normalizeH="0" baseline="0" noProof="0">
               <a:ln>
                 <a:noFill/>
               </a:ln>
@@ -5181,7 +5159,7 @@
               <a:defRPr/>
             </a:pPr>
             <a:r>
-              <a:rPr lang="en-US" sz="1200" b="1" kern="0" dirty="0">
+              <a:rPr lang="en-US" sz="1200" b="1" kern="0">
                 <a:solidFill>
                   <a:sysClr val="windowText" lastClr="000000"/>
                 </a:solidFill>
@@ -5208,14 +5186,14 @@
               <a:defRPr/>
             </a:pPr>
             <a:r>
-              <a:rPr lang="en-US" sz="1200" kern="0" dirty="0">
+              <a:rPr lang="en-US" sz="1200" kern="0">
                 <a:solidFill>
                   <a:sysClr val="windowText" lastClr="000000"/>
                 </a:solidFill>
               </a:rPr>
               <a:t>ftp access</a:t>
             </a:r>
-            <a:endParaRPr kumimoji="0" lang="en-US" sz="1200" i="0" u="none" strike="noStrike" kern="0" cap="none" spc="0" normalizeH="0" baseline="0" noProof="0" dirty="0">
+            <a:endParaRPr kumimoji="0" lang="en-US" sz="1200" i="0" u="none" strike="noStrike" kern="0" cap="none" spc="0" normalizeH="0" baseline="0" noProof="0">
               <a:ln>
                 <a:noFill/>
               </a:ln>
@@ -5385,7 +5363,7 @@
               <a:defRPr/>
             </a:pPr>
             <a:r>
-              <a:rPr lang="en-US" sz="1200" kern="0" dirty="0">
+              <a:rPr lang="en-US" sz="1200" kern="0">
                 <a:solidFill>
                   <a:sysClr val="windowText" lastClr="000000"/>
                 </a:solidFill>
@@ -5398,7 +5376,7 @@
               <a:defRPr/>
             </a:pPr>
             <a:r>
-              <a:rPr lang="en-US" sz="1200" kern="0" dirty="0">
+              <a:rPr lang="en-US" sz="1200" kern="0">
                 <a:solidFill>
                   <a:sysClr val="windowText" lastClr="000000"/>
                 </a:solidFill>
@@ -5864,7 +5842,7 @@
               <a:defRPr/>
             </a:pPr>
             <a:r>
-              <a:rPr lang="en-US" sz="1200" b="1" kern="0" dirty="0">
+              <a:rPr lang="en-US" sz="1200" b="1" kern="0">
                 <a:solidFill>
                   <a:sysClr val="windowText" lastClr="000000"/>
                 </a:solidFill>
@@ -5891,7 +5869,7 @@
               <a:defRPr/>
             </a:pPr>
             <a:r>
-              <a:rPr lang="en-US" sz="1200" kern="0" dirty="0">
+              <a:rPr lang="en-US" sz="1200" kern="0">
                 <a:solidFill>
                   <a:sysClr val="windowText" lastClr="000000"/>
                 </a:solidFill>

</xml_diff>